<commit_message>
Update identification and kalman filtering code
</commit_message>
<xml_diff>
--- a/Laboratorio_IMAD/Attitude_estimation/Attitude_estimation.pptx
+++ b/Laboratorio_IMAD/Attitude_estimation/Attitude_estimation.pptx
@@ -243,7 +243,7 @@
           <a:p>
             <a:fld id="{59398A42-2B4A-4CAA-8DA7-6778F5CC34C6}" type="datetimeFigureOut">
               <a:rPr lang="en-US" smtClean="0"/>
-              <a:t>12/13/2017</a:t>
+              <a:t>12/11/2018</a:t>
             </a:fld>
             <a:endParaRPr lang="en-US"/>
           </a:p>
@@ -3556,7 +3556,7 @@
       </p:sp>
       <p:pic>
         <p:nvPicPr>
-          <p:cNvPr id="9" name="Immagine 8"/>
+          <p:cNvPr id="3" name="Immagine 2"/>
           <p:cNvPicPr>
             <a:picLocks noChangeAspect="1"/>
           </p:cNvPicPr>
@@ -3564,36 +3564,6 @@
         </p:nvPicPr>
         <p:blipFill>
           <a:blip r:embed="rId3">
-            <a:extLst>
-              <a:ext uri="{28A0092B-C50C-407E-A947-70E740481C1C}">
-                <a14:useLocalDpi xmlns:a14="http://schemas.microsoft.com/office/drawing/2010/main" val="0"/>
-              </a:ext>
-            </a:extLst>
-          </a:blip>
-          <a:stretch>
-            <a:fillRect/>
-          </a:stretch>
-        </p:blipFill>
-        <p:spPr>
-          <a:xfrm>
-            <a:off x="9984432" y="4539172"/>
-            <a:ext cx="1872208" cy="1884689"/>
-          </a:xfrm>
-          <a:prstGeom prst="rect">
-            <a:avLst/>
-          </a:prstGeom>
-        </p:spPr>
-      </p:pic>
-      <p:pic>
-        <p:nvPicPr>
-          <p:cNvPr id="3" name="Immagine 2"/>
-          <p:cNvPicPr>
-            <a:picLocks noChangeAspect="1"/>
-          </p:cNvPicPr>
-          <p:nvPr/>
-        </p:nvPicPr>
-        <p:blipFill>
-          <a:blip r:embed="rId4">
             <a:extLst>
               <a:ext uri="{28A0092B-C50C-407E-A947-70E740481C1C}">
                 <a14:useLocalDpi xmlns:a14="http://schemas.microsoft.com/office/drawing/2010/main" val="0"/>
@@ -3622,8 +3592,8 @@
         </p:nvSpPr>
         <p:spPr>
           <a:xfrm>
-            <a:off x="1468868" y="3501008"/>
-            <a:ext cx="9254265" cy="461665"/>
+            <a:off x="1981928" y="3284984"/>
+            <a:ext cx="8051884" cy="1938992"/>
           </a:xfrm>
           <a:prstGeom prst="rect">
             <a:avLst/>
@@ -3635,147 +3605,62 @@
           </a:bodyPr>
           <a:lstStyle/>
           <a:p>
-            <a:r>
-              <a:rPr lang="en-US" sz="2400" dirty="0" smtClean="0">
+            <a:pPr algn="ctr"/>
+            <a:r>
+              <a:rPr lang="en-US" sz="2400" b="1" dirty="0" smtClean="0">
                 <a:solidFill>
                   <a:srgbClr val="002060"/>
                 </a:solidFill>
                 <a:latin typeface="Segoe UI Light" panose="020B0502040204020203" pitchFamily="34" charset="0"/>
                 <a:cs typeface="Segoe UI Light" panose="020B0502040204020203" pitchFamily="34" charset="0"/>
               </a:rPr>
-              <a:t>Mirko Mazzoleni - </a:t>
-            </a:r>
-            <a:r>
-              <a:rPr lang="en-US" sz="2400" dirty="0" err="1" smtClean="0">
+              <a:t>Mirko Mazzoleni </a:t>
+            </a:r>
+          </a:p>
+          <a:p>
+            <a:pPr algn="ctr"/>
+            <a:endParaRPr lang="en-US" sz="2400" dirty="0">
+              <a:solidFill>
+                <a:srgbClr val="002060"/>
+              </a:solidFill>
+              <a:latin typeface="Segoe UI Light" panose="020B0502040204020203" pitchFamily="34" charset="0"/>
+              <a:cs typeface="Segoe UI Light" panose="020B0502040204020203" pitchFamily="34" charset="0"/>
+            </a:endParaRPr>
+          </a:p>
+          <a:p>
+            <a:r>
+              <a:rPr lang="en-US" sz="2400" b="1" dirty="0" smtClean="0">
                 <a:solidFill>
                   <a:srgbClr val="002060"/>
                 </a:solidFill>
                 <a:latin typeface="Segoe UI Light" panose="020B0502040204020203" pitchFamily="34" charset="0"/>
                 <a:cs typeface="Segoe UI Light" panose="020B0502040204020203" pitchFamily="34" charset="0"/>
               </a:rPr>
-              <a:t>corso</a:t>
-            </a:r>
-            <a:r>
-              <a:rPr lang="en-US" sz="2400" dirty="0" smtClean="0">
+              <a:t>Corso di IDENTIFICAZIONE DEI MODELLI E ANALISI DEI DATI</a:t>
+            </a:r>
+          </a:p>
+          <a:p>
+            <a:endParaRPr lang="it-IT" sz="2400" b="1" dirty="0">
+              <a:solidFill>
+                <a:srgbClr val="002060"/>
+              </a:solidFill>
+              <a:latin typeface="Segoe UI Light" panose="020B0502040204020203" pitchFamily="34" charset="0"/>
+              <a:cs typeface="Segoe UI Light" panose="020B0502040204020203" pitchFamily="34" charset="0"/>
+            </a:endParaRPr>
+          </a:p>
+          <a:p>
+            <a:pPr algn="ctr"/>
+            <a:r>
+              <a:rPr lang="it-IT" sz="2400" b="1" dirty="0" smtClean="0">
                 <a:solidFill>
                   <a:srgbClr val="002060"/>
                 </a:solidFill>
                 <a:latin typeface="Segoe UI Light" panose="020B0502040204020203" pitchFamily="34" charset="0"/>
                 <a:cs typeface="Segoe UI Light" panose="020B0502040204020203" pitchFamily="34" charset="0"/>
               </a:rPr>
-              <a:t> di </a:t>
-            </a:r>
-            <a:r>
-              <a:rPr lang="en-US" sz="2400" dirty="0" err="1" smtClean="0">
-                <a:solidFill>
-                  <a:srgbClr val="002060"/>
-                </a:solidFill>
-                <a:latin typeface="Segoe UI Light" panose="020B0502040204020203" pitchFamily="34" charset="0"/>
-                <a:cs typeface="Segoe UI Light" panose="020B0502040204020203" pitchFamily="34" charset="0"/>
-              </a:rPr>
-              <a:t>Identificazione</a:t>
-            </a:r>
-            <a:r>
-              <a:rPr lang="en-US" sz="2400" dirty="0" smtClean="0">
-                <a:solidFill>
-                  <a:srgbClr val="002060"/>
-                </a:solidFill>
-                <a:latin typeface="Segoe UI Light" panose="020B0502040204020203" pitchFamily="34" charset="0"/>
-                <a:cs typeface="Segoe UI Light" panose="020B0502040204020203" pitchFamily="34" charset="0"/>
-              </a:rPr>
-              <a:t> </a:t>
-            </a:r>
-            <a:r>
-              <a:rPr lang="en-US" sz="2400" dirty="0" err="1">
-                <a:solidFill>
-                  <a:srgbClr val="002060"/>
-                </a:solidFill>
-                <a:latin typeface="Segoe UI Light" panose="020B0502040204020203" pitchFamily="34" charset="0"/>
-                <a:cs typeface="Segoe UI Light" panose="020B0502040204020203" pitchFamily="34" charset="0"/>
-              </a:rPr>
-              <a:t>dei</a:t>
-            </a:r>
-            <a:r>
-              <a:rPr lang="en-US" sz="2400" dirty="0">
-                <a:solidFill>
-                  <a:srgbClr val="002060"/>
-                </a:solidFill>
-                <a:latin typeface="Segoe UI Light" panose="020B0502040204020203" pitchFamily="34" charset="0"/>
-                <a:cs typeface="Segoe UI Light" panose="020B0502040204020203" pitchFamily="34" charset="0"/>
-              </a:rPr>
-              <a:t> </a:t>
-            </a:r>
-            <a:r>
-              <a:rPr lang="en-US" sz="2400" dirty="0" err="1">
-                <a:solidFill>
-                  <a:srgbClr val="002060"/>
-                </a:solidFill>
-                <a:latin typeface="Segoe UI Light" panose="020B0502040204020203" pitchFamily="34" charset="0"/>
-                <a:cs typeface="Segoe UI Light" panose="020B0502040204020203" pitchFamily="34" charset="0"/>
-              </a:rPr>
-              <a:t>modelli</a:t>
-            </a:r>
-            <a:r>
-              <a:rPr lang="en-US" sz="2400" dirty="0">
-                <a:solidFill>
-                  <a:srgbClr val="002060"/>
-                </a:solidFill>
-                <a:latin typeface="Segoe UI Light" panose="020B0502040204020203" pitchFamily="34" charset="0"/>
-                <a:cs typeface="Segoe UI Light" panose="020B0502040204020203" pitchFamily="34" charset="0"/>
-              </a:rPr>
-              <a:t> e </a:t>
-            </a:r>
-            <a:r>
-              <a:rPr lang="en-US" sz="2400" dirty="0" err="1">
-                <a:solidFill>
-                  <a:srgbClr val="002060"/>
-                </a:solidFill>
-                <a:latin typeface="Segoe UI Light" panose="020B0502040204020203" pitchFamily="34" charset="0"/>
-                <a:cs typeface="Segoe UI Light" panose="020B0502040204020203" pitchFamily="34" charset="0"/>
-              </a:rPr>
-              <a:t>analisi</a:t>
-            </a:r>
-            <a:r>
-              <a:rPr lang="en-US" sz="2400" dirty="0">
-                <a:solidFill>
-                  <a:srgbClr val="002060"/>
-                </a:solidFill>
-                <a:latin typeface="Segoe UI Light" panose="020B0502040204020203" pitchFamily="34" charset="0"/>
-                <a:cs typeface="Segoe UI Light" panose="020B0502040204020203" pitchFamily="34" charset="0"/>
-              </a:rPr>
-              <a:t> </a:t>
-            </a:r>
-            <a:r>
-              <a:rPr lang="en-US" sz="2400" dirty="0" err="1">
-                <a:solidFill>
-                  <a:srgbClr val="002060"/>
-                </a:solidFill>
-                <a:latin typeface="Segoe UI Light" panose="020B0502040204020203" pitchFamily="34" charset="0"/>
-                <a:cs typeface="Segoe UI Light" panose="020B0502040204020203" pitchFamily="34" charset="0"/>
-              </a:rPr>
-              <a:t>dei</a:t>
-            </a:r>
-            <a:r>
-              <a:rPr lang="en-US" sz="2400" dirty="0">
-                <a:solidFill>
-                  <a:srgbClr val="002060"/>
-                </a:solidFill>
-                <a:latin typeface="Segoe UI Light" panose="020B0502040204020203" pitchFamily="34" charset="0"/>
-                <a:cs typeface="Segoe UI Light" panose="020B0502040204020203" pitchFamily="34" charset="0"/>
-              </a:rPr>
-              <a:t> </a:t>
-            </a:r>
-            <a:r>
-              <a:rPr lang="en-US" sz="2400" dirty="0" err="1" smtClean="0">
-                <a:solidFill>
-                  <a:srgbClr val="002060"/>
-                </a:solidFill>
-                <a:latin typeface="Segoe UI Light" panose="020B0502040204020203" pitchFamily="34" charset="0"/>
-                <a:cs typeface="Segoe UI Light" panose="020B0502040204020203" pitchFamily="34" charset="0"/>
-              </a:rPr>
-              <a:t>dati</a:t>
-            </a:r>
-            <a:endParaRPr lang="en-US" sz="2400" dirty="0">
+              <a:t>A.A. 2018/2019</a:t>
+            </a:r>
+            <a:endParaRPr lang="en-US" sz="2400" b="1" dirty="0">
               <a:solidFill>
                 <a:srgbClr val="002060"/>
               </a:solidFill>
@@ -3785,6 +3670,36 @@
           </a:p>
         </p:txBody>
       </p:sp>
+      <p:pic>
+        <p:nvPicPr>
+          <p:cNvPr id="6" name="Immagine 5"/>
+          <p:cNvPicPr>
+            <a:picLocks noChangeAspect="1"/>
+          </p:cNvPicPr>
+          <p:nvPr/>
+        </p:nvPicPr>
+        <p:blipFill>
+          <a:blip r:embed="rId4" cstate="print">
+            <a:extLst>
+              <a:ext uri="{28A0092B-C50C-407E-A947-70E740481C1C}">
+                <a14:useLocalDpi xmlns:a14="http://schemas.microsoft.com/office/drawing/2010/main" val="0"/>
+              </a:ext>
+            </a:extLst>
+          </a:blip>
+          <a:stretch>
+            <a:fillRect/>
+          </a:stretch>
+        </p:blipFill>
+        <p:spPr>
+          <a:xfrm>
+            <a:off x="8112224" y="4725144"/>
+            <a:ext cx="4175524" cy="1790725"/>
+          </a:xfrm>
+          <a:prstGeom prst="rect">
+            <a:avLst/>
+          </a:prstGeom>
+        </p:spPr>
+      </p:pic>
     </p:spTree>
     <p:extLst>
       <p:ext uri="{BB962C8B-B14F-4D97-AF65-F5344CB8AC3E}">
@@ -3899,8 +3814,8 @@
           </a:p>
         </p:txBody>
       </p:sp>
-      <mc:AlternateContent xmlns:mc="http://schemas.openxmlformats.org/markup-compatibility/2006">
-        <mc:Choice xmlns:a14="http://schemas.microsoft.com/office/drawing/2010/main" Requires="a14">
+      <mc:AlternateContent xmlns:mc="http://schemas.openxmlformats.org/markup-compatibility/2006" xmlns:a14="http://schemas.microsoft.com/office/drawing/2010/main">
+        <mc:Choice Requires="a14">
           <p:sp>
             <p:nvSpPr>
               <p:cNvPr id="7" name="Rettangolo 6"/>
@@ -4313,7 +4228,7 @@
             </p:txBody>
           </p:sp>
         </mc:Choice>
-        <mc:Fallback>
+        <mc:Fallback xmlns="">
           <p:sp>
             <p:nvSpPr>
               <p:cNvPr id="7" name="Rettangolo 6"/>
@@ -6987,8 +6902,8 @@
           </p:sp>
         </mc:Fallback>
       </mc:AlternateContent>
-      <mc:AlternateContent xmlns:mc="http://schemas.openxmlformats.org/markup-compatibility/2006" xmlns:a14="http://schemas.microsoft.com/office/drawing/2010/main">
-        <mc:Choice Requires="a14">
+      <mc:AlternateContent xmlns:mc="http://schemas.openxmlformats.org/markup-compatibility/2006">
+        <mc:Choice xmlns:a14="http://schemas.microsoft.com/office/drawing/2010/main" Requires="a14">
           <p:sp>
             <p:nvSpPr>
               <p:cNvPr id="11" name="Rettangolo 10"/>
@@ -6998,7 +6913,7 @@
             <p:spPr>
               <a:xfrm>
                 <a:off x="335360" y="3911032"/>
-                <a:ext cx="4468146" cy="509178"/>
+                <a:ext cx="4602798" cy="509178"/>
               </a:xfrm>
               <a:prstGeom prst="rect">
                 <a:avLst/>
@@ -7020,7 +6935,7 @@
                       <m:sSup>
                         <m:sSupPr>
                           <m:ctrlPr>
-                            <a:rPr lang="it-IT" sz="2400" i="1" kern="0">
+                            <a:rPr lang="it-IT" sz="2400" i="1" kern="0" smtClean="0">
                               <a:latin typeface="Cambria Math" panose="02040503050406030204" pitchFamily="18" charset="0"/>
                             </a:rPr>
                           </m:ctrlPr>
@@ -7035,10 +6950,10 @@
                         </m:e>
                         <m:sup>
                           <m:r>
-                            <a:rPr lang="it-IT" sz="2400" i="1" kern="0">
+                            <a:rPr lang="it-IT" sz="2400" b="0" i="1" kern="0" smtClean="0">
                               <a:latin typeface="Cambria Math" panose="02040503050406030204" pitchFamily="18" charset="0"/>
                             </a:rPr>
-                            <m:t>𝑎</m:t>
+                            <m:t>𝑚</m:t>
                           </m:r>
                         </m:sup>
                       </m:sSup>
@@ -7179,10 +7094,10 @@
                         </m:e>
                         <m:sup>
                           <m:r>
-                            <a:rPr lang="it-IT" sz="2400" i="1" kern="0">
+                            <a:rPr lang="it-IT" sz="2400" b="0" i="1" kern="0" smtClean="0">
                               <a:latin typeface="Cambria Math" panose="02040503050406030204" pitchFamily="18" charset="0"/>
                             </a:rPr>
-                            <m:t>𝑎</m:t>
+                            <m:t>𝑚</m:t>
                           </m:r>
                         </m:sup>
                       </m:sSup>
@@ -7211,7 +7126,7 @@
             </p:txBody>
           </p:sp>
         </mc:Choice>
-        <mc:Fallback xmlns="">
+        <mc:Fallback>
           <p:sp>
             <p:nvSpPr>
               <p:cNvPr id="11" name="Rettangolo 10"/>
@@ -7223,12 +7138,12 @@
             <p:spPr>
               <a:xfrm>
                 <a:off x="335360" y="3911032"/>
-                <a:ext cx="4468146" cy="509178"/>
+                <a:ext cx="4602798" cy="509178"/>
               </a:xfrm>
               <a:prstGeom prst="rect">
                 <a:avLst/>
               </a:prstGeom>
-              <a:blipFill rotWithShape="0">
+              <a:blipFill>
                 <a:blip r:embed="rId4"/>
                 <a:stretch>
                   <a:fillRect/>
@@ -18839,7 +18754,7 @@
                     <a:latin typeface="Segoe UI Light" panose="020B0502040204020203" pitchFamily="34" charset="0"/>
                     <a:cs typeface="Segoe UI Light" panose="020B0502040204020203" pitchFamily="34" charset="0"/>
                   </a:rPr>
-                  <a:t>sensor measurements </a:t>
+                  <a:t>sensors measurements </a:t>
                 </a:r>
                 <a:r>
                   <a:rPr lang="en-US" sz="2400" dirty="0">
@@ -19119,7 +19034,7 @@
               <a:prstGeom prst="rect">
                 <a:avLst/>
               </a:prstGeom>
-              <a:blipFill rotWithShape="0">
+              <a:blipFill>
                 <a:blip r:embed="rId3"/>
                 <a:stretch>
                   <a:fillRect l="-683" b="-2712"/>
@@ -19288,7 +19203,17 @@
                     <a:latin typeface="Segoe UI Light" panose="020B0502040204020203" pitchFamily="34" charset="0"/>
                     <a:cs typeface="Segoe UI Light" panose="020B0502040204020203" pitchFamily="34" charset="0"/>
                   </a:rPr>
-                  <a:t> frame rotate</a:t>
+                  <a:t> frame </a:t>
+                </a:r>
+                <a:r>
+                  <a:rPr lang="it-IT" sz="2400" b="1" dirty="0" err="1" smtClean="0">
+                    <a:solidFill>
+                      <a:srgbClr val="23373B"/>
+                    </a:solidFill>
+                    <a:latin typeface="Segoe UI Light" panose="020B0502040204020203" pitchFamily="34" charset="0"/>
+                    <a:cs typeface="Segoe UI Light" panose="020B0502040204020203" pitchFamily="34" charset="0"/>
+                  </a:rPr>
+                  <a:t>rotates</a:t>
                 </a:r>
                 <a:endParaRPr lang="it-IT" sz="2400" b="1" dirty="0">
                   <a:solidFill>
@@ -19516,7 +19441,7 @@
               <a:prstGeom prst="rect">
                 <a:avLst/>
               </a:prstGeom>
-              <a:blipFill rotWithShape="0">
+              <a:blipFill>
                 <a:blip r:embed="rId5"/>
                 <a:stretch>
                   <a:fillRect l="-1549" b="-2375"/>
@@ -19663,8 +19588,8 @@
         </p:nvSpPr>
         <p:spPr>
           <a:xfrm>
-            <a:off x="218405" y="1945655"/>
-            <a:ext cx="6048672" cy="3831818"/>
+            <a:off x="218404" y="1945655"/>
+            <a:ext cx="6627871" cy="4247317"/>
           </a:xfrm>
           <a:prstGeom prst="rect">
             <a:avLst/>
@@ -19682,7 +19607,7 @@
               </a:lnSpc>
             </a:pPr>
             <a:r>
-              <a:rPr lang="it-IT" dirty="0" smtClean="0">
+              <a:rPr lang="it-IT" sz="2000" dirty="0" smtClean="0">
                 <a:solidFill>
                   <a:srgbClr val="23373B"/>
                 </a:solidFill>
@@ -19692,7 +19617,7 @@
               <a:t>A </a:t>
             </a:r>
             <a:r>
-              <a:rPr lang="it-IT" dirty="0" err="1" smtClean="0">
+              <a:rPr lang="it-IT" sz="2000" b="1" dirty="0" err="1" smtClean="0">
                 <a:solidFill>
                   <a:srgbClr val="23373B"/>
                 </a:solidFill>
@@ -19702,7 +19627,7 @@
               <a:t>rotation</a:t>
             </a:r>
             <a:r>
-              <a:rPr lang="it-IT" dirty="0" smtClean="0">
+              <a:rPr lang="it-IT" sz="2000" b="1" dirty="0" smtClean="0">
                 <a:solidFill>
                   <a:srgbClr val="23373B"/>
                 </a:solidFill>
@@ -19712,7 +19637,7 @@
               <a:t> </a:t>
             </a:r>
             <a:r>
-              <a:rPr lang="it-IT" dirty="0" err="1" smtClean="0">
+              <a:rPr lang="it-IT" sz="2000" b="1" dirty="0" err="1" smtClean="0">
                 <a:solidFill>
                   <a:srgbClr val="23373B"/>
                 </a:solidFill>
@@ -19722,7 +19647,7 @@
               <a:t>matrix</a:t>
             </a:r>
             <a:r>
-              <a:rPr lang="it-IT" dirty="0" smtClean="0">
+              <a:rPr lang="it-IT" sz="2000" b="1" dirty="0" smtClean="0">
                 <a:solidFill>
                   <a:srgbClr val="23373B"/>
                 </a:solidFill>
@@ -19732,7 +19657,7 @@
               <a:t> </a:t>
             </a:r>
             <a:r>
-              <a:rPr lang="it-IT" dirty="0" err="1" smtClean="0">
+              <a:rPr lang="it-IT" sz="2000" dirty="0" err="1" smtClean="0">
                 <a:solidFill>
                   <a:srgbClr val="23373B"/>
                 </a:solidFill>
@@ -19742,7 +19667,7 @@
               <a:t>has</a:t>
             </a:r>
             <a:r>
-              <a:rPr lang="it-IT" dirty="0" smtClean="0">
+              <a:rPr lang="it-IT" sz="2000" dirty="0" smtClean="0">
                 <a:solidFill>
                   <a:srgbClr val="23373B"/>
                 </a:solidFill>
@@ -19752,7 +19677,7 @@
               <a:t> 3 </a:t>
             </a:r>
             <a:r>
-              <a:rPr lang="it-IT" dirty="0" err="1" smtClean="0">
+              <a:rPr lang="it-IT" sz="2000" dirty="0" err="1" smtClean="0">
                 <a:solidFill>
                   <a:srgbClr val="23373B"/>
                 </a:solidFill>
@@ -19762,7 +19687,7 @@
               <a:t>meanings</a:t>
             </a:r>
             <a:r>
-              <a:rPr lang="it-IT" dirty="0" smtClean="0">
+              <a:rPr lang="it-IT" sz="2000" dirty="0" smtClean="0">
                 <a:solidFill>
                   <a:srgbClr val="23373B"/>
                 </a:solidFill>
@@ -19778,7 +19703,7 @@
                 <a:spcPct val="150000"/>
               </a:lnSpc>
             </a:pPr>
-            <a:endParaRPr lang="it-IT" dirty="0" smtClean="0">
+            <a:endParaRPr lang="it-IT" sz="2000" dirty="0" smtClean="0">
               <a:solidFill>
                 <a:srgbClr val="23373B"/>
               </a:solidFill>
@@ -19795,7 +19720,7 @@
               <a:buAutoNum type="arabicPeriod"/>
             </a:pPr>
             <a:r>
-              <a:rPr lang="it-IT" dirty="0" err="1" smtClean="0">
+              <a:rPr lang="it-IT" sz="2000" dirty="0" err="1" smtClean="0">
                 <a:solidFill>
                   <a:srgbClr val="23373B"/>
                 </a:solidFill>
@@ -19805,7 +19730,7 @@
               <a:t>Gives</a:t>
             </a:r>
             <a:r>
-              <a:rPr lang="it-IT" dirty="0" smtClean="0">
+              <a:rPr lang="it-IT" sz="2000" dirty="0" smtClean="0">
                 <a:solidFill>
                   <a:srgbClr val="23373B"/>
                 </a:solidFill>
@@ -19815,7 +19740,7 @@
               <a:t> the </a:t>
             </a:r>
             <a:r>
-              <a:rPr lang="it-IT" dirty="0" err="1" smtClean="0">
+              <a:rPr lang="it-IT" sz="2000" dirty="0" err="1" smtClean="0">
                 <a:solidFill>
                   <a:srgbClr val="23373B"/>
                 </a:solidFill>
@@ -19825,7 +19750,7 @@
               <a:t>orientation</a:t>
             </a:r>
             <a:r>
-              <a:rPr lang="it-IT" dirty="0" smtClean="0">
+              <a:rPr lang="it-IT" sz="2000" dirty="0" smtClean="0">
                 <a:solidFill>
                   <a:srgbClr val="23373B"/>
                 </a:solidFill>
@@ -19835,7 +19760,7 @@
               <a:t> of </a:t>
             </a:r>
             <a:r>
-              <a:rPr lang="it-IT" dirty="0" err="1" smtClean="0">
+              <a:rPr lang="it-IT" sz="2000" dirty="0" err="1" smtClean="0">
                 <a:solidFill>
                   <a:srgbClr val="23373B"/>
                 </a:solidFill>
@@ -19845,7 +19770,7 @@
               <a:t>one</a:t>
             </a:r>
             <a:r>
-              <a:rPr lang="it-IT" dirty="0" smtClean="0">
+              <a:rPr lang="it-IT" sz="2000" dirty="0" smtClean="0">
                 <a:solidFill>
                   <a:srgbClr val="23373B"/>
                 </a:solidFill>
@@ -19855,7 +19780,7 @@
               <a:t> set of </a:t>
             </a:r>
             <a:r>
-              <a:rPr lang="it-IT" dirty="0" err="1" smtClean="0">
+              <a:rPr lang="it-IT" sz="2000" dirty="0" err="1" smtClean="0">
                 <a:solidFill>
                   <a:srgbClr val="23373B"/>
                 </a:solidFill>
@@ -19865,66 +19790,46 @@
               <a:t>coordinates</a:t>
             </a:r>
             <a:r>
-              <a:rPr lang="it-IT" dirty="0" smtClean="0">
+              <a:rPr lang="it-IT" sz="2000" dirty="0" smtClean="0">
                 <a:solidFill>
                   <a:srgbClr val="23373B"/>
                 </a:solidFill>
                 <a:latin typeface="Segoe UI Light" panose="020B0502040204020203" pitchFamily="34" charset="0"/>
                 <a:cs typeface="Segoe UI Light" panose="020B0502040204020203" pitchFamily="34" charset="0"/>
               </a:rPr>
-              <a:t> </a:t>
-            </a:r>
-            <a:r>
-              <a:rPr lang="it-IT" dirty="0" err="1" smtClean="0">
+              <a:t> with </a:t>
+            </a:r>
+            <a:r>
+              <a:rPr lang="it-IT" sz="2000" dirty="0" err="1" smtClean="0">
                 <a:solidFill>
                   <a:srgbClr val="23373B"/>
                 </a:solidFill>
                 <a:latin typeface="Segoe UI Light" panose="020B0502040204020203" pitchFamily="34" charset="0"/>
                 <a:cs typeface="Segoe UI Light" panose="020B0502040204020203" pitchFamily="34" charset="0"/>
               </a:rPr>
-              <a:t>wit</a:t>
-            </a:r>
-            <a:r>
-              <a:rPr lang="it-IT" dirty="0" smtClean="0">
+              <a:t>respect</a:t>
+            </a:r>
+            <a:r>
+              <a:rPr lang="it-IT" sz="2000" dirty="0" smtClean="0">
                 <a:solidFill>
                   <a:srgbClr val="23373B"/>
                 </a:solidFill>
                 <a:latin typeface="Segoe UI Light" panose="020B0502040204020203" pitchFamily="34" charset="0"/>
                 <a:cs typeface="Segoe UI Light" panose="020B0502040204020203" pitchFamily="34" charset="0"/>
               </a:rPr>
-              <a:t> </a:t>
-            </a:r>
-            <a:r>
-              <a:rPr lang="it-IT" dirty="0" err="1" smtClean="0">
+              <a:t> to </a:t>
+            </a:r>
+            <a:r>
+              <a:rPr lang="it-IT" sz="2000" dirty="0" err="1" smtClean="0">
                 <a:solidFill>
                   <a:srgbClr val="23373B"/>
                 </a:solidFill>
                 <a:latin typeface="Segoe UI Light" panose="020B0502040204020203" pitchFamily="34" charset="0"/>
                 <a:cs typeface="Segoe UI Light" panose="020B0502040204020203" pitchFamily="34" charset="0"/>
               </a:rPr>
-              <a:t>respect</a:t>
-            </a:r>
-            <a:r>
-              <a:rPr lang="it-IT" dirty="0" smtClean="0">
-                <a:solidFill>
-                  <a:srgbClr val="23373B"/>
-                </a:solidFill>
-                <a:latin typeface="Segoe UI Light" panose="020B0502040204020203" pitchFamily="34" charset="0"/>
-                <a:cs typeface="Segoe UI Light" panose="020B0502040204020203" pitchFamily="34" charset="0"/>
-              </a:rPr>
-              <a:t> to </a:t>
-            </a:r>
-            <a:r>
-              <a:rPr lang="it-IT" dirty="0" err="1" smtClean="0">
-                <a:solidFill>
-                  <a:srgbClr val="23373B"/>
-                </a:solidFill>
-                <a:latin typeface="Segoe UI Light" panose="020B0502040204020203" pitchFamily="34" charset="0"/>
-                <a:cs typeface="Segoe UI Light" panose="020B0502040204020203" pitchFamily="34" charset="0"/>
-              </a:rPr>
               <a:t>another</a:t>
             </a:r>
-            <a:endParaRPr lang="it-IT" dirty="0" smtClean="0">
+            <a:endParaRPr lang="it-IT" sz="2000" dirty="0" smtClean="0">
               <a:solidFill>
                 <a:srgbClr val="23373B"/>
               </a:solidFill>
@@ -19940,7 +19845,7 @@
               <a:buFont typeface="+mj-lt"/>
               <a:buAutoNum type="arabicPeriod"/>
             </a:pPr>
-            <a:endParaRPr lang="it-IT" dirty="0" smtClean="0">
+            <a:endParaRPr lang="it-IT" sz="2000" dirty="0" smtClean="0">
               <a:solidFill>
                 <a:srgbClr val="23373B"/>
               </a:solidFill>
@@ -19957,7 +19862,7 @@
               <a:buAutoNum type="arabicPeriod"/>
             </a:pPr>
             <a:r>
-              <a:rPr lang="it-IT" dirty="0" err="1" smtClean="0">
+              <a:rPr lang="it-IT" sz="2000" dirty="0" err="1" smtClean="0">
                 <a:solidFill>
                   <a:srgbClr val="23373B"/>
                 </a:solidFill>
@@ -19967,7 +19872,7 @@
               <a:t>Represents</a:t>
             </a:r>
             <a:r>
-              <a:rPr lang="it-IT" dirty="0" smtClean="0">
+              <a:rPr lang="it-IT" sz="2000" dirty="0" smtClean="0">
                 <a:solidFill>
                   <a:srgbClr val="23373B"/>
                 </a:solidFill>
@@ -19977,7 +19882,7 @@
               <a:t> a </a:t>
             </a:r>
             <a:r>
-              <a:rPr lang="it-IT" dirty="0" err="1" smtClean="0">
+              <a:rPr lang="it-IT" sz="2000" dirty="0" err="1" smtClean="0">
                 <a:solidFill>
                   <a:srgbClr val="23373B"/>
                 </a:solidFill>
@@ -19987,7 +19892,7 @@
               <a:t>coordinates</a:t>
             </a:r>
             <a:r>
-              <a:rPr lang="it-IT" dirty="0" smtClean="0">
+              <a:rPr lang="it-IT" sz="2000" dirty="0" smtClean="0">
                 <a:solidFill>
                   <a:srgbClr val="23373B"/>
                 </a:solidFill>
@@ -19997,7 +19902,7 @@
               <a:t> </a:t>
             </a:r>
             <a:r>
-              <a:rPr lang="it-IT" dirty="0" err="1" smtClean="0">
+              <a:rPr lang="it-IT" sz="2000" dirty="0" err="1" smtClean="0">
                 <a:solidFill>
                   <a:srgbClr val="23373B"/>
                 </a:solidFill>
@@ -20007,7 +19912,7 @@
               <a:t>transformation</a:t>
             </a:r>
             <a:r>
-              <a:rPr lang="it-IT" dirty="0" smtClean="0">
+              <a:rPr lang="it-IT" sz="2000" dirty="0" smtClean="0">
                 <a:solidFill>
                   <a:srgbClr val="23373B"/>
                 </a:solidFill>
@@ -20017,7 +19922,7 @@
               <a:t> </a:t>
             </a:r>
             <a:r>
-              <a:rPr lang="it-IT" dirty="0" err="1" smtClean="0">
+              <a:rPr lang="it-IT" sz="2000" dirty="0" err="1" smtClean="0">
                 <a:solidFill>
                   <a:srgbClr val="23373B"/>
                 </a:solidFill>
@@ -20027,7 +19932,7 @@
               <a:t>that</a:t>
             </a:r>
             <a:r>
-              <a:rPr lang="it-IT" dirty="0" smtClean="0">
+              <a:rPr lang="it-IT" sz="2000" dirty="0" smtClean="0">
                 <a:solidFill>
                   <a:srgbClr val="23373B"/>
                 </a:solidFill>
@@ -20037,7 +19942,7 @@
               <a:t> </a:t>
             </a:r>
             <a:r>
-              <a:rPr lang="it-IT" dirty="0" err="1" smtClean="0">
+              <a:rPr lang="it-IT" sz="2000" dirty="0" err="1" smtClean="0">
                 <a:solidFill>
                   <a:srgbClr val="23373B"/>
                 </a:solidFill>
@@ -20047,7 +19952,7 @@
               <a:t>relates</a:t>
             </a:r>
             <a:r>
-              <a:rPr lang="it-IT" dirty="0" smtClean="0">
+              <a:rPr lang="it-IT" sz="2000" dirty="0" smtClean="0">
                 <a:solidFill>
                   <a:srgbClr val="23373B"/>
                 </a:solidFill>
@@ -20057,7 +19962,7 @@
               <a:t> the </a:t>
             </a:r>
             <a:r>
-              <a:rPr lang="it-IT" dirty="0" err="1" smtClean="0">
+              <a:rPr lang="it-IT" sz="2000" dirty="0" err="1" smtClean="0">
                 <a:solidFill>
                   <a:srgbClr val="23373B"/>
                 </a:solidFill>
@@ -20067,7 +19972,7 @@
               <a:t>coordinates</a:t>
             </a:r>
             <a:r>
-              <a:rPr lang="it-IT" dirty="0" smtClean="0">
+              <a:rPr lang="it-IT" sz="2000" dirty="0" smtClean="0">
                 <a:solidFill>
                   <a:srgbClr val="23373B"/>
                 </a:solidFill>
@@ -20077,7 +19982,7 @@
               <a:t> of the </a:t>
             </a:r>
             <a:r>
-              <a:rPr lang="it-IT" dirty="0" err="1" smtClean="0">
+              <a:rPr lang="it-IT" sz="2000" dirty="0" err="1" smtClean="0">
                 <a:solidFill>
                   <a:srgbClr val="23373B"/>
                 </a:solidFill>
@@ -20087,7 +19992,7 @@
               <a:t>same</a:t>
             </a:r>
             <a:r>
-              <a:rPr lang="it-IT" dirty="0" smtClean="0">
+              <a:rPr lang="it-IT" sz="2000" dirty="0" smtClean="0">
                 <a:solidFill>
                   <a:srgbClr val="23373B"/>
                 </a:solidFill>
@@ -20097,7 +20002,7 @@
               <a:t> </a:t>
             </a:r>
             <a:r>
-              <a:rPr lang="it-IT" dirty="0" err="1" smtClean="0">
+              <a:rPr lang="it-IT" sz="2000" dirty="0" err="1" smtClean="0">
                 <a:solidFill>
                   <a:srgbClr val="23373B"/>
                 </a:solidFill>
@@ -20107,7 +20012,7 @@
               <a:t>point</a:t>
             </a:r>
             <a:r>
-              <a:rPr lang="it-IT" dirty="0" smtClean="0">
+              <a:rPr lang="it-IT" sz="2000" dirty="0" smtClean="0">
                 <a:solidFill>
                   <a:srgbClr val="23373B"/>
                 </a:solidFill>
@@ -20117,7 +20022,7 @@
               <a:t> in </a:t>
             </a:r>
             <a:r>
-              <a:rPr lang="it-IT" dirty="0" err="1" smtClean="0">
+              <a:rPr lang="it-IT" sz="2000" dirty="0" err="1" smtClean="0">
                 <a:solidFill>
                   <a:srgbClr val="23373B"/>
                 </a:solidFill>
@@ -20127,7 +20032,7 @@
               <a:t>two</a:t>
             </a:r>
             <a:r>
-              <a:rPr lang="it-IT" dirty="0" smtClean="0">
+              <a:rPr lang="it-IT" sz="2000" dirty="0" smtClean="0">
                 <a:solidFill>
                   <a:srgbClr val="23373B"/>
                 </a:solidFill>
@@ -20137,7 +20042,7 @@
               <a:t> </a:t>
             </a:r>
             <a:r>
-              <a:rPr lang="it-IT" dirty="0" err="1" smtClean="0">
+              <a:rPr lang="it-IT" sz="2000" dirty="0" err="1" smtClean="0">
                 <a:solidFill>
                   <a:srgbClr val="23373B"/>
                 </a:solidFill>
@@ -20147,7 +20052,7 @@
               <a:t>different</a:t>
             </a:r>
             <a:r>
-              <a:rPr lang="it-IT" dirty="0" smtClean="0">
+              <a:rPr lang="it-IT" sz="2000" dirty="0" smtClean="0">
                 <a:solidFill>
                   <a:srgbClr val="23373B"/>
                 </a:solidFill>
@@ -20157,7 +20062,7 @@
               <a:t> </a:t>
             </a:r>
             <a:r>
-              <a:rPr lang="it-IT" dirty="0" err="1" smtClean="0">
+              <a:rPr lang="it-IT" sz="2000" dirty="0" err="1" smtClean="0">
                 <a:solidFill>
                   <a:srgbClr val="23373B"/>
                 </a:solidFill>
@@ -20166,7 +20071,7 @@
               </a:rPr>
               <a:t>frames</a:t>
             </a:r>
-            <a:endParaRPr lang="it-IT" dirty="0" smtClean="0">
+            <a:endParaRPr lang="it-IT" sz="2000" dirty="0" smtClean="0">
               <a:solidFill>
                 <a:srgbClr val="23373B"/>
               </a:solidFill>
@@ -20182,7 +20087,7 @@
               <a:buFont typeface="+mj-lt"/>
               <a:buAutoNum type="arabicPeriod"/>
             </a:pPr>
-            <a:endParaRPr lang="en-US" dirty="0" smtClean="0">
+            <a:endParaRPr lang="en-US" sz="2000" dirty="0" smtClean="0">
               <a:solidFill>
                 <a:srgbClr val="23373B"/>
               </a:solidFill>
@@ -20199,7 +20104,7 @@
               <a:buAutoNum type="arabicPeriod"/>
             </a:pPr>
             <a:r>
-              <a:rPr lang="it-IT" dirty="0" err="1" smtClean="0">
+              <a:rPr lang="it-IT" sz="2000" dirty="0" err="1" smtClean="0">
                 <a:solidFill>
                   <a:srgbClr val="23373B"/>
                 </a:solidFill>
@@ -20209,7 +20114,7 @@
               <a:t>Is</a:t>
             </a:r>
             <a:r>
-              <a:rPr lang="it-IT" dirty="0" smtClean="0">
+              <a:rPr lang="it-IT" sz="2000" dirty="0" smtClean="0">
                 <a:solidFill>
                   <a:srgbClr val="23373B"/>
                 </a:solidFill>
@@ -20219,7 +20124,7 @@
               <a:t> the operator </a:t>
             </a:r>
             <a:r>
-              <a:rPr lang="it-IT" dirty="0" err="1" smtClean="0">
+              <a:rPr lang="it-IT" sz="2000" dirty="0" err="1" smtClean="0">
                 <a:solidFill>
                   <a:srgbClr val="23373B"/>
                 </a:solidFill>
@@ -20229,7 +20134,7 @@
               <a:t>which</a:t>
             </a:r>
             <a:r>
-              <a:rPr lang="it-IT" dirty="0" smtClean="0">
+              <a:rPr lang="it-IT" sz="2000" dirty="0" smtClean="0">
                 <a:solidFill>
                   <a:srgbClr val="23373B"/>
                 </a:solidFill>
@@ -20239,7 +20144,7 @@
               <a:t> </a:t>
             </a:r>
             <a:r>
-              <a:rPr lang="it-IT" dirty="0" err="1" smtClean="0">
+              <a:rPr lang="it-IT" sz="2000" dirty="0" err="1" smtClean="0">
                 <a:solidFill>
                   <a:srgbClr val="23373B"/>
                 </a:solidFill>
@@ -20249,7 +20154,7 @@
               <a:t>rotates</a:t>
             </a:r>
             <a:r>
-              <a:rPr lang="it-IT" dirty="0" smtClean="0">
+              <a:rPr lang="it-IT" sz="2000" dirty="0" smtClean="0">
                 <a:solidFill>
                   <a:srgbClr val="23373B"/>
                 </a:solidFill>
@@ -20259,7 +20164,7 @@
               <a:t> a </a:t>
             </a:r>
             <a:r>
-              <a:rPr lang="it-IT" dirty="0" err="1" smtClean="0">
+              <a:rPr lang="it-IT" sz="2000" dirty="0" err="1" smtClean="0">
                 <a:solidFill>
                   <a:srgbClr val="23373B"/>
                 </a:solidFill>
@@ -20269,7 +20174,7 @@
               <a:t>vector</a:t>
             </a:r>
             <a:r>
-              <a:rPr lang="it-IT" dirty="0" smtClean="0">
+              <a:rPr lang="it-IT" sz="2000" dirty="0" smtClean="0">
                 <a:solidFill>
                   <a:srgbClr val="23373B"/>
                 </a:solidFill>
@@ -20279,7 +20184,7 @@
               <a:t> in the </a:t>
             </a:r>
             <a:r>
-              <a:rPr lang="it-IT" dirty="0" err="1" smtClean="0">
+              <a:rPr lang="it-IT" sz="2000" dirty="0" err="1" smtClean="0">
                 <a:solidFill>
                   <a:srgbClr val="23373B"/>
                 </a:solidFill>
@@ -20289,7 +20194,7 @@
               <a:t>same</a:t>
             </a:r>
             <a:r>
-              <a:rPr lang="it-IT" dirty="0" smtClean="0">
+              <a:rPr lang="it-IT" sz="2000" dirty="0" smtClean="0">
                 <a:solidFill>
                   <a:srgbClr val="23373B"/>
                 </a:solidFill>
@@ -20298,7 +20203,7 @@
               </a:rPr>
               <a:t> frame</a:t>
             </a:r>
-            <a:endParaRPr lang="it-IT" dirty="0">
+            <a:endParaRPr lang="it-IT" sz="2000" dirty="0">
               <a:solidFill>
                 <a:srgbClr val="23373B"/>
               </a:solidFill>
@@ -20316,8 +20221,8 @@
         </p:nvGrpSpPr>
         <p:grpSpPr>
           <a:xfrm>
-            <a:off x="6285875" y="1550408"/>
-            <a:ext cx="5529817" cy="4587330"/>
+            <a:off x="7320136" y="1700808"/>
+            <a:ext cx="4953753" cy="4436558"/>
             <a:chOff x="6285875" y="1550408"/>
             <a:chExt cx="5529817" cy="4587330"/>
           </a:xfrm>
@@ -21670,7 +21575,7 @@
                 <a:cs typeface="Segoe UI Light" panose="020B0502040204020203" pitchFamily="34" charset="0"/>
                 <a:sym typeface="Wingdings" panose="05000000000000000000" pitchFamily="2" charset="2"/>
               </a:rPr>
-              <a:t>idenpendent</a:t>
+              <a:t>indenpendent</a:t>
             </a:r>
             <a:r>
               <a:rPr lang="it-IT" sz="2400" dirty="0" smtClean="0">
@@ -22512,8 +22417,8 @@
         </p:nvSpPr>
         <p:spPr>
           <a:xfrm>
-            <a:off x="8328249" y="5168463"/>
-            <a:ext cx="3240360" cy="1200329"/>
+            <a:off x="8328248" y="5168463"/>
+            <a:ext cx="3456383" cy="1200329"/>
           </a:xfrm>
           <a:prstGeom prst="rect">
             <a:avLst/>
@@ -22543,7 +22448,7 @@
                 <a:latin typeface="Segoe UI Light" panose="020B0502040204020203" pitchFamily="34" charset="0"/>
                 <a:cs typeface="Segoe UI Light" panose="020B0502040204020203" pitchFamily="34" charset="0"/>
               </a:rPr>
-              <a:t> position in the </a:t>
+              <a:t> positions in the </a:t>
             </a:r>
             <a:r>
               <a:rPr lang="it-IT" sz="2400" b="1" dirty="0" err="1" smtClean="0">

</xml_diff>